<commit_message>
Update work from 5 aug
</commit_message>
<xml_diff>
--- a/ppt/Consumer_Complaints.pptx
+++ b/ppt/Consumer_Complaints.pptx
@@ -624,7 +624,7 @@
             <a:fld id="{08B9EBBA-996F-894A-B54A-D6246ED52CEA}" type="datetimeFigureOut">
               <a:rPr lang="en-US" smtClean="0"/>
               <a:pPr/>
-              <a:t>8/5/16</a:t>
+              <a:t>8/6/16</a:t>
             </a:fld>
             <a:endParaRPr lang="en-US" dirty="0"/>
           </a:p>
@@ -922,7 +922,7 @@
             <a:fld id="{09B482E8-6E0E-1B4F-B1FD-C69DB9E858D9}" type="datetimeFigureOut">
               <a:rPr lang="en-US" smtClean="0"/>
               <a:pPr/>
-              <a:t>8/5/16</a:t>
+              <a:t>8/6/16</a:t>
             </a:fld>
             <a:endParaRPr lang="en-US" dirty="0"/>
           </a:p>
@@ -1173,7 +1173,7 @@
             <a:fld id="{09B482E8-6E0E-1B4F-B1FD-C69DB9E858D9}" type="datetimeFigureOut">
               <a:rPr lang="en-US" smtClean="0"/>
               <a:pPr/>
-              <a:t>8/5/16</a:t>
+              <a:t>8/6/16</a:t>
             </a:fld>
             <a:endParaRPr lang="en-US" dirty="0"/>
           </a:p>
@@ -1716,7 +1716,7 @@
             <a:fld id="{09B482E8-6E0E-1B4F-B1FD-C69DB9E858D9}" type="datetimeFigureOut">
               <a:rPr lang="en-US" smtClean="0"/>
               <a:pPr/>
-              <a:t>8/5/16</a:t>
+              <a:t>8/6/16</a:t>
             </a:fld>
             <a:endParaRPr lang="en-US" dirty="0"/>
           </a:p>
@@ -1967,7 +1967,7 @@
             <a:fld id="{09B482E8-6E0E-1B4F-B1FD-C69DB9E858D9}" type="datetimeFigureOut">
               <a:rPr lang="en-US" smtClean="0"/>
               <a:pPr/>
-              <a:t>8/5/16</a:t>
+              <a:t>8/6/16</a:t>
             </a:fld>
             <a:endParaRPr lang="en-US" dirty="0"/>
           </a:p>
@@ -2502,7 +2502,7 @@
             <a:fld id="{09B482E8-6E0E-1B4F-B1FD-C69DB9E858D9}" type="datetimeFigureOut">
               <a:rPr lang="en-US" smtClean="0"/>
               <a:pPr/>
-              <a:t>8/5/16</a:t>
+              <a:t>8/6/16</a:t>
             </a:fld>
             <a:endParaRPr lang="en-US" dirty="0"/>
           </a:p>
@@ -2802,7 +2802,7 @@
             <a:fld id="{09B482E8-6E0E-1B4F-B1FD-C69DB9E858D9}" type="datetimeFigureOut">
               <a:rPr lang="en-US" smtClean="0"/>
               <a:pPr/>
-              <a:t>8/5/16</a:t>
+              <a:t>8/6/16</a:t>
             </a:fld>
             <a:endParaRPr lang="en-US" dirty="0"/>
           </a:p>
@@ -2979,7 +2979,7 @@
             <a:fld id="{C6C52C72-DE31-F449-A4ED-4C594FD91407}" type="datetimeFigureOut">
               <a:rPr lang="en-US" smtClean="0"/>
               <a:pPr/>
-              <a:t>8/5/16</a:t>
+              <a:t>8/6/16</a:t>
             </a:fld>
             <a:endParaRPr lang="en-US" dirty="0"/>
           </a:p>
@@ -3161,7 +3161,7 @@
             <a:fld id="{ED62726E-379B-B349-9EED-81ED093FA806}" type="datetimeFigureOut">
               <a:rPr lang="en-US" smtClean="0"/>
               <a:pPr/>
-              <a:t>8/5/16</a:t>
+              <a:t>8/6/16</a:t>
             </a:fld>
             <a:endParaRPr lang="en-US" dirty="0"/>
           </a:p>
@@ -3333,7 +3333,7 @@
             <a:fld id="{9B3A1323-8D79-1946-B0D7-40001CF92E9D}" type="datetimeFigureOut">
               <a:rPr lang="en-US" smtClean="0"/>
               <a:pPr/>
-              <a:t>8/5/16</a:t>
+              <a:t>8/6/16</a:t>
             </a:fld>
             <a:endParaRPr lang="en-US" dirty="0"/>
           </a:p>
@@ -3586,7 +3586,7 @@
             <a:fld id="{8DFA1846-DA80-1C48-A609-854EA85C59AD}" type="datetimeFigureOut">
               <a:rPr lang="en-US" smtClean="0"/>
               <a:pPr/>
-              <a:t>8/5/16</a:t>
+              <a:t>8/6/16</a:t>
             </a:fld>
             <a:endParaRPr lang="en-US" dirty="0"/>
           </a:p>
@@ -3885,7 +3885,7 @@
             <a:fld id="{57302355-E14B-8545-A8F8-0FE83CC9D524}" type="datetimeFigureOut">
               <a:rPr lang="en-US" smtClean="0"/>
               <a:pPr/>
-              <a:t>8/5/16</a:t>
+              <a:t>8/6/16</a:t>
             </a:fld>
             <a:endParaRPr lang="en-US" dirty="0"/>
           </a:p>
@@ -4329,7 +4329,7 @@
             <a:fld id="{02640F58-564D-2B4F-AE67-E407BA4FCF45}" type="datetimeFigureOut">
               <a:rPr lang="en-US" smtClean="0"/>
               <a:pPr/>
-              <a:t>8/5/16</a:t>
+              <a:t>8/6/16</a:t>
             </a:fld>
             <a:endParaRPr lang="en-US" dirty="0"/>
           </a:p>
@@ -4449,7 +4449,7 @@
             <a:fld id="{F13A34C8-038E-2045-AF43-DF7DBB8E0E9E}" type="datetimeFigureOut">
               <a:rPr lang="en-US" smtClean="0"/>
               <a:pPr/>
-              <a:t>8/5/16</a:t>
+              <a:t>8/6/16</a:t>
             </a:fld>
             <a:endParaRPr lang="en-US" dirty="0"/>
           </a:p>
@@ -4546,7 +4546,7 @@
             <a:fld id="{8818C68F-D26B-8F47-958C-23B49CF8A634}" type="datetimeFigureOut">
               <a:rPr lang="en-US" smtClean="0"/>
               <a:pPr/>
-              <a:t>8/5/16</a:t>
+              <a:t>8/6/16</a:t>
             </a:fld>
             <a:endParaRPr lang="en-US" dirty="0"/>
           </a:p>
@@ -4831,7 +4831,7 @@
             <a:fld id="{D0DF5E60-9974-AC48-9591-99C2BB44B7CF}" type="datetimeFigureOut">
               <a:rPr lang="en-US" smtClean="0"/>
               <a:pPr/>
-              <a:t>8/5/16</a:t>
+              <a:t>8/6/16</a:t>
             </a:fld>
             <a:endParaRPr lang="en-US" dirty="0"/>
           </a:p>
@@ -5124,7 +5124,7 @@
             <a:fld id="{18C79C5D-2A6F-F04D-97DA-BEF2467B64E4}" type="datetimeFigureOut">
               <a:rPr lang="en-US" smtClean="0"/>
               <a:pPr/>
-              <a:t>8/5/16</a:t>
+              <a:t>8/6/16</a:t>
             </a:fld>
             <a:endParaRPr lang="en-US" dirty="0"/>
           </a:p>
@@ -5656,7 +5656,7 @@
             <a:fld id="{09B482E8-6E0E-1B4F-B1FD-C69DB9E858D9}" type="datetimeFigureOut">
               <a:rPr lang="en-US" smtClean="0"/>
               <a:pPr/>
-              <a:t>8/5/16</a:t>
+              <a:t>8/6/16</a:t>
             </a:fld>
             <a:endParaRPr lang="en-US" dirty="0"/>
           </a:p>
@@ -6252,6 +6252,13 @@
   <p:clrMapOvr>
     <a:masterClrMapping/>
   </p:clrMapOvr>
+  <p:timing>
+    <p:tnLst>
+      <p:par>
+        <p:cTn id="1" dur="indefinite" restart="never" nodeType="tmRoot"/>
+      </p:par>
+    </p:tnLst>
+  </p:timing>
 </p:sld>
 </file>
 
@@ -6312,16 +6319,14 @@
           </a:bodyPr>
           <a:lstStyle/>
           <a:p>
+            <a:pPr lvl="1"/>
             <a:r>
               <a:rPr lang="en-US" dirty="0" smtClean="0"/>
-              <a:t>REFRENCES</a:t>
-            </a:r>
-          </a:p>
-          <a:p>
-            <a:pPr lvl="1"/>
+              <a:t>Figure </a:t>
+            </a:r>
             <a:r>
               <a:rPr lang="en-US" dirty="0" smtClean="0"/>
-              <a:t>Figure on Slide 4 - Cross </a:t>
+              <a:t>on Slide 4 - Cross </a:t>
             </a:r>
             <a:r>
               <a:rPr lang="en-US" dirty="0"/>
@@ -6391,7 +6396,6 @@
               <a:rPr lang="en-US" dirty="0" smtClean="0"/>
               <a:t> (used in EDA)</a:t>
             </a:r>
-            <a:endParaRPr lang="en-US" dirty="0" smtClean="0"/>
           </a:p>
           <a:p>
             <a:endParaRPr lang="en-US" dirty="0"/>
@@ -6408,6 +6412,13 @@
   <p:clrMapOvr>
     <a:masterClrMapping/>
   </p:clrMapOvr>
+  <p:timing>
+    <p:tnLst>
+      <p:par>
+        <p:cTn id="1" dur="indefinite" restart="never" nodeType="tmRoot"/>
+      </p:par>
+    </p:tnLst>
+  </p:timing>
 </p:sld>
 </file>
 
@@ -6514,6 +6525,13 @@
   <p:clrMapOvr>
     <a:masterClrMapping/>
   </p:clrMapOvr>
+  <p:timing>
+    <p:tnLst>
+      <p:par>
+        <p:cTn id="1" dur="indefinite" restart="never" nodeType="tmRoot"/>
+      </p:par>
+    </p:tnLst>
+  </p:timing>
 </p:sld>
 </file>
 
@@ -6581,15 +6599,7 @@
             <a:pPr lvl="1"/>
             <a:r>
               <a:rPr lang="en-US" dirty="0" smtClean="0"/>
-              <a:t>Mechanical Engineering (BSME)/</a:t>
-            </a:r>
-            <a:r>
-              <a:rPr lang="en-US" dirty="0" smtClean="0"/>
-              <a:t>Electrophysicist</a:t>
-            </a:r>
-            <a:r>
-              <a:rPr lang="en-US" dirty="0" smtClean="0"/>
-              <a:t> (MSEE)</a:t>
+              <a:t>Mechanical Engineering (BSME)/Electrophysicist (MSEE)</a:t>
             </a:r>
           </a:p>
           <a:p>
@@ -6611,6 +6621,13 @@
   <p:clrMapOvr>
     <a:masterClrMapping/>
   </p:clrMapOvr>
+  <p:timing>
+    <p:tnLst>
+      <p:par>
+        <p:cTn id="1" dur="indefinite" restart="never" nodeType="tmRoot"/>
+      </p:par>
+    </p:tnLst>
+  </p:timing>
 </p:sld>
 </file>
 
@@ -6695,19 +6712,73 @@
         </p:nvSpPr>
         <p:spPr>
           <a:xfrm>
-            <a:off x="1643743" y="2133600"/>
-            <a:ext cx="5189309" cy="3561588"/>
+            <a:off x="1136822" y="2024742"/>
+            <a:ext cx="6141074" cy="3561588"/>
           </a:xfrm>
         </p:spPr>
         <p:txBody>
-          <a:bodyPr/>
+          <a:bodyPr>
+            <a:normAutofit/>
+          </a:bodyPr>
           <a:lstStyle/>
           <a:p>
             <a:r>
               <a:rPr lang="en-US" dirty="0" smtClean="0"/>
-              <a:t>Can Machine Learning be used to predict the result of a complaint levied against a company?</a:t>
-            </a:r>
-            <a:endParaRPr lang="en-US" dirty="0"/>
+              <a:t>Can the result of complaint resolution be predicted?</a:t>
+            </a:r>
+          </a:p>
+          <a:p>
+            <a:pPr lvl="1"/>
+            <a:r>
+              <a:rPr lang="en-US" dirty="0" smtClean="0"/>
+              <a:t>Closed / Untimely response</a:t>
+            </a:r>
+            <a:r>
+              <a:rPr lang="en-US" dirty="0"/>
+              <a:t> </a:t>
+            </a:r>
+            <a:r>
+              <a:rPr lang="en-US" dirty="0" smtClean="0"/>
+              <a:t>      				[3.5%]           </a:t>
+            </a:r>
+          </a:p>
+          <a:p>
+            <a:pPr lvl="1"/>
+            <a:r>
+              <a:rPr lang="en-US" dirty="0" smtClean="0"/>
+              <a:t>Closed </a:t>
+            </a:r>
+            <a:r>
+              <a:rPr lang="en-US" dirty="0"/>
+              <a:t>with </a:t>
+            </a:r>
+            <a:r>
+              <a:rPr lang="en-US" dirty="0" smtClean="0"/>
+              <a:t>explanation           				[76.4%]      </a:t>
+            </a:r>
+          </a:p>
+          <a:p>
+            <a:pPr lvl="1"/>
+            <a:r>
+              <a:rPr lang="en-US" dirty="0" smtClean="0"/>
+              <a:t> Closed </a:t>
+            </a:r>
+            <a:r>
+              <a:rPr lang="en-US" dirty="0"/>
+              <a:t>with </a:t>
+            </a:r>
+            <a:r>
+              <a:rPr lang="en-US" dirty="0" smtClean="0"/>
+              <a:t>non-monetary/monetary relief</a:t>
+            </a:r>
+            <a:r>
+              <a:rPr lang="en-US" dirty="0"/>
+              <a:t> 	</a:t>
+            </a:r>
+            <a:r>
+              <a:rPr lang="en-US" dirty="0" smtClean="0"/>
+              <a:t> 	[20.1%]</a:t>
+            </a:r>
           </a:p>
         </p:txBody>
       </p:sp>
@@ -6721,6 +6792,13 @@
   <p:clrMapOvr>
     <a:masterClrMapping/>
   </p:clrMapOvr>
+  <p:timing>
+    <p:tnLst>
+      <p:par>
+        <p:cTn id="1" dur="indefinite" restart="never" nodeType="tmRoot"/>
+      </p:par>
+    </p:tnLst>
+  </p:timing>
 </p:sld>
 </file>
 
@@ -6830,11 +6908,7 @@
             </a:r>
             <a:r>
               <a:rPr lang="en-US" sz="1800" dirty="0" smtClean="0"/>
-              <a:t>CPFB</a:t>
-            </a:r>
-            <a:r>
-              <a:rPr lang="en-US" sz="1800" dirty="0" smtClean="0"/>
-              <a:t>)  </a:t>
+              <a:t>CPFB)  </a:t>
             </a:r>
             <a:endParaRPr lang="en-US" sz="1800" dirty="0"/>
           </a:p>
@@ -6873,15 +6947,7 @@
                   <a:srgbClr val="FF0000"/>
                 </a:solidFill>
               </a:rPr>
-              <a:t>Data is 80% “No”, 20% “Yes</a:t>
-            </a:r>
-            <a:r>
-              <a:rPr lang="en-US" sz="1800" b="1" dirty="0" smtClean="0">
-                <a:solidFill>
-                  <a:srgbClr val="FF0000"/>
-                </a:solidFill>
-              </a:rPr>
-              <a:t>”</a:t>
+              <a:t>Data is 80% “No”, 20% “Yes”</a:t>
             </a:r>
           </a:p>
           <a:p>
@@ -7035,6 +7101,13 @@
   <p:clrMapOvr>
     <a:masterClrMapping/>
   </p:clrMapOvr>
+  <p:timing>
+    <p:tnLst>
+      <p:par>
+        <p:cTn id="1" dur="indefinite" restart="never" nodeType="tmRoot"/>
+      </p:par>
+    </p:tnLst>
+  </p:timing>
 </p:sld>
 </file>
 
@@ -7118,21 +7191,8 @@
                   <a:srgbClr val="FF0000"/>
                 </a:solidFill>
               </a:rPr>
-              <a:t>MODEL</a:t>
-            </a:r>
-            <a:r>
-              <a:rPr lang="en-US" dirty="0" smtClean="0">
-                <a:solidFill>
-                  <a:srgbClr val="FF0000"/>
-                </a:solidFill>
-              </a:rPr>
-              <a:t>: Logistic Regression</a:t>
-            </a:r>
-            <a:endParaRPr lang="en-US" dirty="0" smtClean="0">
-              <a:solidFill>
-                <a:srgbClr val="FF0000"/>
-              </a:solidFill>
-            </a:endParaRPr>
+              <a:t>MODEL: Logistic Regression</a:t>
+            </a:r>
           </a:p>
           <a:p>
             <a:r>
@@ -7148,39 +7208,18 @@
                   <a:srgbClr val="FF0000"/>
                 </a:solidFill>
               </a:rPr>
-              <a:t>MODEL</a:t>
-            </a:r>
+              <a:t>MODEL: TFIDF – Multiple classifiers </a:t>
+            </a:r>
+          </a:p>
+          <a:p>
+            <a:pPr lvl="1"/>
             <a:r>
               <a:rPr lang="en-US" dirty="0" smtClean="0">
                 <a:solidFill>
                   <a:srgbClr val="FF0000"/>
                 </a:solidFill>
               </a:rPr>
-              <a:t>: TFIDF – Multiple classifiers </a:t>
-            </a:r>
-            <a:endParaRPr lang="en-US" dirty="0" smtClean="0">
-              <a:solidFill>
-                <a:srgbClr val="FF0000"/>
-              </a:solidFill>
-            </a:endParaRPr>
-          </a:p>
-          <a:p>
-            <a:pPr lvl="1"/>
-            <a:r>
-              <a:rPr lang="en-US" dirty="0" smtClean="0">
-                <a:solidFill>
-                  <a:srgbClr val="FF0000"/>
-                </a:solidFill>
-              </a:rPr>
-              <a:t>MODEL</a:t>
-            </a:r>
-            <a:r>
-              <a:rPr lang="en-US" dirty="0" smtClean="0">
-                <a:solidFill>
-                  <a:srgbClr val="FF0000"/>
-                </a:solidFill>
-              </a:rPr>
-              <a:t>: Word2Vec</a:t>
+              <a:t>MODEL: Word2Vec</a:t>
             </a:r>
             <a:endParaRPr lang="en-US" dirty="0">
               <a:solidFill>
@@ -7235,6 +7274,13 @@
   <p:clrMapOvr>
     <a:masterClrMapping/>
   </p:clrMapOvr>
+  <p:timing>
+    <p:tnLst>
+      <p:par>
+        <p:cTn id="1" dur="indefinite" restart="never" nodeType="tmRoot"/>
+      </p:par>
+    </p:tnLst>
+  </p:timing>
 </p:sld>
 </file>
 
@@ -7419,6 +7465,13 @@
   <p:clrMapOvr>
     <a:masterClrMapping/>
   </p:clrMapOvr>
+  <p:timing>
+    <p:tnLst>
+      <p:par>
+        <p:cTn id="1" dur="indefinite" restart="never" nodeType="tmRoot"/>
+      </p:par>
+    </p:tnLst>
+  </p:timing>
 </p:sld>
 </file>
 
@@ -7481,15 +7534,7 @@
           <a:p>
             <a:r>
               <a:rPr lang="en-US" dirty="0" smtClean="0"/>
-              <a:t>Using the predictive power of the model, a company could address the situations where they provide some sort of </a:t>
-            </a:r>
-            <a:r>
-              <a:rPr lang="en-US" dirty="0" smtClean="0"/>
-              <a:t>relief </a:t>
-            </a:r>
-            <a:r>
-              <a:rPr lang="en-US" dirty="0" smtClean="0"/>
-              <a:t>(monetary or other) and determine the most economic was to do so </a:t>
+              <a:t>Using the predictive power of the model, a company could address the situations where they provide some sort of relief (monetary or other) and determine the most economic was to do so </a:t>
             </a:r>
           </a:p>
           <a:p>
@@ -7531,6 +7576,13 @@
   <p:clrMapOvr>
     <a:masterClrMapping/>
   </p:clrMapOvr>
+  <p:timing>
+    <p:tnLst>
+      <p:par>
+        <p:cTn id="1" dur="indefinite" restart="never" nodeType="tmRoot"/>
+      </p:par>
+    </p:tnLst>
+  </p:timing>
 </p:sld>
 </file>
 
@@ -7568,11 +7620,7 @@
           <a:p>
             <a:r>
               <a:rPr lang="en-US" dirty="0" smtClean="0"/>
-              <a:t>Project Info/Contact </a:t>
-            </a:r>
-            <a:r>
-              <a:rPr lang="en-US" dirty="0" smtClean="0"/>
-              <a:t>Info</a:t>
+              <a:t>Project Info/Contact Info</a:t>
             </a:r>
             <a:endParaRPr lang="en-US" dirty="0"/>
           </a:p>
@@ -7632,21 +7680,8 @@
             <a:pPr lvl="1" fontAlgn="base"/>
             <a:r>
               <a:rPr lang="en-US" dirty="0"/>
-              <a:t>https://</a:t>
-            </a:r>
-            <a:r>
-              <a:rPr lang="en-US" dirty="0"/>
-              <a:t>www.linkedin.com</a:t>
-            </a:r>
-            <a:r>
-              <a:rPr lang="en-US" dirty="0"/>
-              <a:t>/in/</a:t>
-            </a:r>
-            <a:r>
-              <a:rPr lang="en-US" dirty="0"/>
-              <a:t>christophermmichael</a:t>
-            </a:r>
-            <a:endParaRPr lang="en-US" dirty="0"/>
+              <a:t>https://www.linkedin.com/in/christophermmichael</a:t>
+            </a:r>
           </a:p>
           <a:p>
             <a:r>
@@ -7685,6 +7720,13 @@
   <p:clrMapOvr>
     <a:masterClrMapping/>
   </p:clrMapOvr>
+  <p:timing>
+    <p:tnLst>
+      <p:par>
+        <p:cTn id="1" dur="indefinite" restart="never" nodeType="tmRoot"/>
+      </p:par>
+    </p:tnLst>
+  </p:timing>
 </p:sld>
 </file>
 

</xml_diff>

<commit_message>
Adding 8 Aug work
</commit_message>
<xml_diff>
--- a/ppt/Consumer_Complaints.pptx
+++ b/ppt/Consumer_Complaints.pptx
@@ -6789,24 +6789,18 @@
             </a:r>
             <a:r>
               <a:rPr lang="en-US" dirty="0" smtClean="0"/>
-              <a:t> 	[20.1</a:t>
-            </a:r>
-            <a:r>
-              <a:rPr lang="en-US" dirty="0" smtClean="0"/>
-              <a:t>%]</a:t>
-            </a:r>
-          </a:p>
-          <a:p>
-            <a:r>
-              <a:rPr lang="en-US" dirty="0" smtClean="0"/>
-              <a:t>For analysis I am using two groupings “Relief provided” and “Relief not provided”</a:t>
+              <a:t> 	[20.1%]</a:t>
             </a:r>
           </a:p>
           <a:p>
             <a:pPr marL="285750" lvl="1"/>
             <a:r>
+              <a:rPr lang="en-US" sz="1800" dirty="0" smtClean="0"/>
+              <a:t>CPFB </a:t>
+            </a:r>
+            <a:r>
               <a:rPr lang="en-US" sz="1800" dirty="0"/>
-              <a:t>CPFB started in </a:t>
+              <a:t>started in </a:t>
             </a:r>
             <a:r>
               <a:rPr lang="en-US" sz="1800" dirty="0" smtClean="0"/>
@@ -6869,8 +6863,8 @@
         </p:nvSpPr>
         <p:spPr>
           <a:xfrm>
-            <a:off x="1544783" y="233215"/>
-            <a:ext cx="3549121" cy="581794"/>
+            <a:off x="1590636" y="327570"/>
+            <a:ext cx="10018713" cy="707258"/>
           </a:xfrm>
         </p:spPr>
         <p:txBody>
@@ -6892,7 +6886,7 @@
             <a:picLocks noGrp="1" noChangeAspect="1"/>
           </p:cNvPicPr>
           <p:nvPr>
-            <p:ph idx="1"/>
+            <p:ph idx="4294967295"/>
           </p:nvPr>
         </p:nvPicPr>
         <p:blipFill>
@@ -6909,7 +6903,7 @@
         </p:blipFill>
         <p:spPr>
           <a:xfrm>
-            <a:off x="9011920" y="295274"/>
+            <a:off x="9398000" y="2835275"/>
             <a:ext cx="2794000" cy="1990725"/>
           </a:xfrm>
         </p:spPr>
@@ -6921,13 +6915,13 @@
             <a:spLocks noGrp="1"/>
           </p:cNvSpPr>
           <p:nvPr>
-            <p:ph type="body" sz="half" idx="2"/>
+            <p:ph type="body" idx="4294967295"/>
           </p:nvPr>
         </p:nvSpPr>
         <p:spPr>
           <a:xfrm>
-            <a:off x="1401698" y="815008"/>
-            <a:ext cx="4671278" cy="5661991"/>
+            <a:off x="1374396" y="1034828"/>
+            <a:ext cx="8023604" cy="3317875"/>
           </a:xfrm>
         </p:spPr>
         <p:txBody>
@@ -6946,13 +6940,8 @@
             </a:r>
             <a:r>
               <a:rPr lang="en-US" sz="2200" dirty="0" smtClean="0"/>
-              <a:t>CFPB</a:t>
-            </a:r>
-            <a:r>
-              <a:rPr lang="en-US" sz="2200" dirty="0" smtClean="0"/>
-              <a:t>)  </a:t>
-            </a:r>
-            <a:endParaRPr lang="en-US" sz="2200" dirty="0" smtClean="0"/>
+              <a:t>CFPB)  </a:t>
+            </a:r>
           </a:p>
           <a:p>
             <a:pPr marL="742950" lvl="1" indent="-285750">
@@ -6972,11 +6961,11 @@
             </a:pPr>
             <a:r>
               <a:rPr lang="en-US" sz="2200" dirty="0"/>
-              <a:t>Data converted from categorical descriptions to numerical values for use in </a:t>
+              <a:t>Data converted from categorical descriptions </a:t>
             </a:r>
             <a:r>
               <a:rPr lang="en-US" sz="2200" dirty="0" smtClean="0"/>
-              <a:t>models</a:t>
+              <a:t>dummy variables</a:t>
             </a:r>
             <a:endParaRPr lang="en-US" sz="2200" dirty="0"/>
           </a:p>
@@ -6987,12 +6976,21 @@
             </a:pPr>
             <a:r>
               <a:rPr lang="en-US" sz="2200" dirty="0"/>
-              <a:t>Text was cleaned and modified for </a:t>
+              <a:t>Text </a:t>
             </a:r>
             <a:r>
               <a:rPr lang="en-US" sz="2200" dirty="0" smtClean="0"/>
-              <a:t>processing</a:t>
-            </a:r>
+              <a:t>was </a:t>
+            </a:r>
+            <a:r>
+              <a:rPr lang="en-US" sz="2200" dirty="0"/>
+              <a:t>cleaned and modified </a:t>
+            </a:r>
+            <a:r>
+              <a:rPr lang="en-US" sz="2200" dirty="0" smtClean="0"/>
+              <a:t>for processing</a:t>
+            </a:r>
+            <a:endParaRPr lang="en-US" sz="2200" dirty="0" smtClean="0"/>
           </a:p>
           <a:p>
             <a:pPr marL="285750" indent="-285750" algn="l">
@@ -7001,21 +6999,8 @@
             </a:pPr>
             <a:r>
               <a:rPr lang="en-US" sz="2200" b="1" dirty="0" smtClean="0"/>
-              <a:t>Data is 80% </a:t>
-            </a:r>
-            <a:r>
-              <a:rPr lang="en-US" sz="2200" b="1" dirty="0" smtClean="0"/>
-              <a:t>“Relief no provided”, </a:t>
-            </a:r>
-            <a:r>
-              <a:rPr lang="en-US" sz="2200" b="1" dirty="0" smtClean="0"/>
-              <a:t>20% </a:t>
-            </a:r>
-            <a:r>
-              <a:rPr lang="en-US" sz="2200" b="1" dirty="0" smtClean="0"/>
-              <a:t>“Relief provided”</a:t>
-            </a:r>
-            <a:endParaRPr lang="en-US" sz="2200" b="1" dirty="0" smtClean="0"/>
+              <a:t>Data is 80% “Relief no provided”, 20% “Relief provided”</a:t>
+            </a:r>
           </a:p>
           <a:p>
             <a:pPr marL="742950" lvl="1" indent="-285750">
@@ -7032,39 +7017,7 @@
                   <a:srgbClr val="FF0000"/>
                 </a:solidFill>
               </a:rPr>
-              <a:t>and also creating a balanced </a:t>
-            </a:r>
-            <a:r>
-              <a:rPr lang="en-US" sz="2200" b="1" dirty="0" smtClean="0">
-                <a:solidFill>
-                  <a:srgbClr val="FF0000"/>
-                </a:solidFill>
-              </a:rPr>
-              <a:t>set </a:t>
-            </a:r>
-            <a:r>
-              <a:rPr lang="en-US" sz="2200" b="1" dirty="0" smtClean="0">
-                <a:solidFill>
-                  <a:srgbClr val="FF0000"/>
-                </a:solidFill>
-              </a:rPr>
-              <a:t>of </a:t>
-            </a:r>
-            <a:r>
-              <a:rPr lang="en-US" sz="2200" b="1" dirty="0" smtClean="0">
-                <a:solidFill>
-                  <a:srgbClr val="FF0000"/>
-                </a:solidFill>
-              </a:rPr>
-              <a:t> randomly selected “Yes</a:t>
-            </a:r>
-            <a:r>
-              <a:rPr lang="en-US" sz="2200" b="1" dirty="0" smtClean="0">
-                <a:solidFill>
-                  <a:srgbClr val="FF0000"/>
-                </a:solidFill>
-              </a:rPr>
-              <a:t>” and “No” results</a:t>
+              <a:t>and also creating a balanced set of  randomly selected “Yes” and “No” results</a:t>
             </a:r>
             <a:endParaRPr lang="en-US" sz="2200" b="1" dirty="0">
               <a:solidFill>
@@ -7096,7 +7049,7 @@
         </p:blipFill>
         <p:spPr>
           <a:xfrm>
-            <a:off x="6044032" y="233186"/>
+            <a:off x="546294" y="4755035"/>
             <a:ext cx="2823210" cy="1297305"/>
           </a:xfrm>
           <a:prstGeom prst="rect">
@@ -7126,7 +7079,7 @@
         </p:blipFill>
         <p:spPr>
           <a:xfrm>
-            <a:off x="6439637" y="1707196"/>
+            <a:off x="3492415" y="4826000"/>
             <a:ext cx="2032000" cy="2032000"/>
           </a:xfrm>
           <a:prstGeom prst="rect">
@@ -7156,7 +7109,7 @@
         </p:blipFill>
         <p:spPr>
           <a:xfrm>
-            <a:off x="8964234" y="4087269"/>
+            <a:off x="9088925" y="5054661"/>
             <a:ext cx="2814320" cy="1524000"/>
           </a:xfrm>
           <a:prstGeom prst="rect">
@@ -7186,7 +7139,7 @@
         </p:blipFill>
         <p:spPr>
           <a:xfrm>
-            <a:off x="9204960" y="2455114"/>
+            <a:off x="6006190" y="5150802"/>
             <a:ext cx="2600960" cy="1463040"/>
           </a:xfrm>
           <a:prstGeom prst="rect">
@@ -7296,7 +7249,23 @@
                   <a:srgbClr val="FF0000"/>
                 </a:solidFill>
               </a:rPr>
-              <a:t>MODEL: Logistic Regression	53.0%</a:t>
+              <a:t>MODEL: Logistic Regression	</a:t>
+            </a:r>
+            <a:r>
+              <a:rPr lang="en-US" dirty="0" smtClean="0">
+                <a:solidFill>
+                  <a:srgbClr val="FF0000"/>
+                </a:solidFill>
+              </a:rPr>
+              <a:t>Accuracy 53.0</a:t>
+            </a:r>
+            <a:r>
+              <a:rPr lang="en-US" dirty="0" smtClean="0">
+                <a:solidFill>
+                  <a:srgbClr val="FF0000"/>
+                </a:solidFill>
+              </a:rPr>
+              <a:t>%</a:t>
             </a:r>
           </a:p>
           <a:p>
@@ -7315,11 +7284,6 @@
               </a:rPr>
               <a:t>MODEL– TFIDF</a:t>
             </a:r>
-            <a:endParaRPr lang="en-US" dirty="0" smtClean="0">
-              <a:solidFill>
-                <a:srgbClr val="FF0000"/>
-              </a:solidFill>
-            </a:endParaRPr>
           </a:p>
           <a:p>
             <a:pPr lvl="2"/>
@@ -7329,7 +7293,23 @@
                   <a:srgbClr val="FF0000"/>
                 </a:solidFill>
               </a:rPr>
-              <a:t>Logistic Regression 		80.3%</a:t>
+              <a:t>Logistic Regression 		</a:t>
+            </a:r>
+            <a:r>
+              <a:rPr lang="en-US" sz="2000" dirty="0">
+                <a:solidFill>
+                  <a:srgbClr val="FF0000"/>
+                </a:solidFill>
+              </a:rPr>
+              <a:t> Accuracy 80.3</a:t>
+            </a:r>
+            <a:r>
+              <a:rPr lang="en-US" sz="2000" dirty="0" smtClean="0">
+                <a:solidFill>
+                  <a:srgbClr val="FF0000"/>
+                </a:solidFill>
+              </a:rPr>
+              <a:t>%</a:t>
             </a:r>
           </a:p>
           <a:p>
@@ -7348,7 +7328,23 @@
                   <a:srgbClr val="FF0000"/>
                 </a:solidFill>
               </a:rPr>
-              <a:t>		78.0%</a:t>
+              <a:t>		</a:t>
+            </a:r>
+            <a:r>
+              <a:rPr lang="en-US" sz="2000" dirty="0">
+                <a:solidFill>
+                  <a:srgbClr val="FF0000"/>
+                </a:solidFill>
+              </a:rPr>
+              <a:t> Accuracy 78.0</a:t>
+            </a:r>
+            <a:r>
+              <a:rPr lang="en-US" sz="2000" dirty="0" smtClean="0">
+                <a:solidFill>
+                  <a:srgbClr val="FF0000"/>
+                </a:solidFill>
+              </a:rPr>
+              <a:t>%</a:t>
             </a:r>
           </a:p>
           <a:p>
@@ -7359,7 +7355,23 @@
                   <a:srgbClr val="FF0000"/>
                 </a:solidFill>
               </a:rPr>
-              <a:t>Multinomial Naïve Bayes	80.9%</a:t>
+              <a:t>Multinomial Naïve Bayes	</a:t>
+            </a:r>
+            <a:r>
+              <a:rPr lang="en-US" sz="2000" dirty="0">
+                <a:solidFill>
+                  <a:srgbClr val="FF0000"/>
+                </a:solidFill>
+              </a:rPr>
+              <a:t> Accuracy 80.9</a:t>
+            </a:r>
+            <a:r>
+              <a:rPr lang="en-US" sz="2000" dirty="0" smtClean="0">
+                <a:solidFill>
+                  <a:srgbClr val="FF0000"/>
+                </a:solidFill>
+              </a:rPr>
+              <a:t>%</a:t>
             </a:r>
           </a:p>
           <a:p>
@@ -7370,7 +7382,23 @@
                   <a:srgbClr val="FF0000"/>
                 </a:solidFill>
               </a:rPr>
-              <a:t>Random Forest			80.1%</a:t>
+              <a:t>Random Forest			</a:t>
+            </a:r>
+            <a:r>
+              <a:rPr lang="en-US" sz="2000" dirty="0">
+                <a:solidFill>
+                  <a:srgbClr val="FF0000"/>
+                </a:solidFill>
+              </a:rPr>
+              <a:t> Accuracy 80.1</a:t>
+            </a:r>
+            <a:r>
+              <a:rPr lang="en-US" sz="2000" dirty="0" smtClean="0">
+                <a:solidFill>
+                  <a:srgbClr val="FF0000"/>
+                </a:solidFill>
+              </a:rPr>
+              <a:t>%</a:t>
             </a:r>
           </a:p>
           <a:p>
@@ -7381,7 +7409,23 @@
                   <a:srgbClr val="FF0000"/>
                 </a:solidFill>
               </a:rPr>
-              <a:t>MODEL: Word2Vec			XX.X%</a:t>
+              <a:t>MODEL: Word2Vec			</a:t>
+            </a:r>
+            <a:r>
+              <a:rPr lang="en-US" dirty="0">
+                <a:solidFill>
+                  <a:srgbClr val="FF0000"/>
+                </a:solidFill>
+              </a:rPr>
+              <a:t> Accuracy XX.X</a:t>
+            </a:r>
+            <a:r>
+              <a:rPr lang="en-US" dirty="0" smtClean="0">
+                <a:solidFill>
+                  <a:srgbClr val="FF0000"/>
+                </a:solidFill>
+              </a:rPr>
+              <a:t>%</a:t>
             </a:r>
             <a:endParaRPr lang="en-US" dirty="0">
               <a:solidFill>
@@ -7413,8 +7457,8 @@
         </p:blipFill>
         <p:spPr>
           <a:xfrm>
-            <a:off x="7718927" y="2760982"/>
-            <a:ext cx="4295775" cy="3520440"/>
+            <a:off x="8070575" y="1557671"/>
+            <a:ext cx="3911736" cy="3205715"/>
           </a:xfrm>
           <a:prstGeom prst="rect">
             <a:avLst/>
@@ -7544,23 +7588,7 @@
                   <a:srgbClr val="FF0000"/>
                 </a:solidFill>
               </a:rPr>
-              <a:t>Using TFIDF, </a:t>
-            </a:r>
-            <a:r>
-              <a:rPr lang="en-US" dirty="0" smtClean="0">
-                <a:solidFill>
-                  <a:srgbClr val="FF0000"/>
-                </a:solidFill>
-              </a:rPr>
-              <a:t>~80% </a:t>
-            </a:r>
-            <a:r>
-              <a:rPr lang="en-US" dirty="0" smtClean="0">
-                <a:solidFill>
-                  <a:srgbClr val="FF0000"/>
-                </a:solidFill>
-              </a:rPr>
-              <a:t>accuracy was obtained </a:t>
+              <a:t>Using TFIDF, ~80% accuracy was obtained </a:t>
             </a:r>
             <a:endParaRPr lang="en-US" dirty="0">
               <a:solidFill>
@@ -7709,15 +7737,28 @@
             <a:pPr lvl="2"/>
             <a:r>
               <a:rPr lang="en-US" dirty="0" smtClean="0"/>
-              <a:t>Does some product drive a company to provide ”relief”</a:t>
+              <a:t>Does </a:t>
+            </a:r>
+            <a:r>
+              <a:rPr lang="en-US" dirty="0" smtClean="0"/>
+              <a:t>the time taken to process a complaint drive the result of providing “relief</a:t>
+            </a:r>
+            <a:r>
+              <a:rPr lang="en-US" dirty="0" smtClean="0"/>
+              <a:t>”</a:t>
             </a:r>
           </a:p>
           <a:p>
             <a:pPr lvl="2"/>
             <a:r>
+              <a:rPr lang="en-US" dirty="0"/>
+              <a:t>Does some product drive a company to provide ”relief</a:t>
+            </a:r>
+            <a:r>
               <a:rPr lang="en-US" dirty="0" smtClean="0"/>
-              <a:t>Does the time taken to process a complaint drive the result of providing “relief”</a:t>
-            </a:r>
+              <a:t>”</a:t>
+            </a:r>
+            <a:endParaRPr lang="en-US" dirty="0"/>
           </a:p>
         </p:txBody>
       </p:sp>

</xml_diff>

<commit_message>
Final Scripts, README Update
</commit_message>
<xml_diff>
--- a/ppt/Consumer_Complaints.pptx
+++ b/ppt/Consumer_Complaints.pptx
@@ -4335,14 +4335,14 @@
           <p:nvPr>
             <p:extLst>
               <p:ext uri="{D42A27DB-BD31-4B8C-83A1-F6EECF244321}">
-                <p14:modId xmlns:p14="http://schemas.microsoft.com/office/powerpoint/2010/main" val="1208984761"/>
+                <p14:modId xmlns:p14="http://schemas.microsoft.com/office/powerpoint/2010/main" val="1097963186"/>
               </p:ext>
             </p:extLst>
           </p:nvPr>
         </p:nvGraphicFramePr>
         <p:xfrm>
           <a:off x="498500" y="1751169"/>
-          <a:ext cx="8891330" cy="3729135"/>
+          <a:ext cx="8389468" cy="4003455"/>
         </p:xfrm>
         <a:graphic>
           <a:graphicData uri="http://schemas.openxmlformats.org/drawingml/2006/table">
@@ -4353,10 +4353,11 @@
               <a:tblGrid>
                 <a:gridCol w="2490531"/>
                 <a:gridCol w="1455525"/>
-                <a:gridCol w="1439911"/>
+                <a:gridCol w="1029652"/>
+                <a:gridCol w="410259"/>
                 <a:gridCol w="1141709"/>
                 <a:gridCol w="913368"/>
-                <a:gridCol w="1450286"/>
+                <a:gridCol w="948424"/>
               </a:tblGrid>
               <a:tr h="306540">
                 <a:tc>
@@ -4401,7 +4402,7 @@
                   </a:txBody>
                   <a:tcPr/>
                 </a:tc>
-                <a:tc>
+                <a:tc gridSpan="2">
                   <a:txBody>
                     <a:bodyPr/>
                     <a:lstStyle/>
@@ -4415,6 +4416,16 @@
                   </a:txBody>
                   <a:tcPr/>
                 </a:tc>
+                <a:tc hMerge="1">
+                  <a:txBody>
+                    <a:bodyPr/>
+                    <a:lstStyle/>
+                    <a:p>
+                      <a:endParaRPr lang="en-US" dirty="0"/>
+                    </a:p>
+                  </a:txBody>
+                  <a:tcPr/>
+                </a:tc>
                 <a:tc>
                   <a:txBody>
                     <a:bodyPr/>
@@ -4445,7 +4456,7 @@
                 </a:tc>
               </a:tr>
               <a:tr h="343367">
-                <a:tc gridSpan="6">
+                <a:tc gridSpan="7">
                   <a:txBody>
                     <a:bodyPr/>
                     <a:lstStyle/>
@@ -4514,6 +4525,16 @@
                   </a:txBody>
                   <a:tcPr/>
                 </a:tc>
+                <a:tc hMerge="1">
+                  <a:txBody>
+                    <a:bodyPr/>
+                    <a:lstStyle/>
+                    <a:p>
+                      <a:endParaRPr lang="en-US"/>
+                    </a:p>
+                  </a:txBody>
+                  <a:tcPr/>
+                </a:tc>
               </a:tr>
               <a:tr h="401735">
                 <a:tc>
@@ -4545,7 +4566,7 @@
                   </a:txBody>
                   <a:tcPr/>
                 </a:tc>
-                <a:tc>
+                <a:tc gridSpan="2">
                   <a:txBody>
                     <a:bodyPr/>
                     <a:lstStyle/>
@@ -4556,6 +4577,16 @@
                   </a:txBody>
                   <a:tcPr/>
                 </a:tc>
+                <a:tc hMerge="1">
+                  <a:txBody>
+                    <a:bodyPr/>
+                    <a:lstStyle/>
+                    <a:p>
+                      <a:endParaRPr lang="en-US"/>
+                    </a:p>
+                  </a:txBody>
+                  <a:tcPr/>
+                </a:tc>
                 <a:tc>
                   <a:txBody>
                     <a:bodyPr/>
@@ -4591,7 +4622,7 @@
                 </a:tc>
               </a:tr>
               <a:tr h="370840">
-                <a:tc gridSpan="6">
+                <a:tc gridSpan="7">
                   <a:txBody>
                     <a:bodyPr/>
                     <a:lstStyle/>
@@ -4656,6 +4687,16 @@
                   </a:txBody>
                   <a:tcPr/>
                 </a:tc>
+                <a:tc hMerge="1">
+                  <a:txBody>
+                    <a:bodyPr/>
+                    <a:lstStyle/>
+                    <a:p>
+                      <a:endParaRPr lang="en-US"/>
+                    </a:p>
+                  </a:txBody>
+                  <a:tcPr/>
+                </a:tc>
               </a:tr>
               <a:tr h="370840">
                 <a:tc>
@@ -4683,13 +4724,23 @@
                   </a:txBody>
                   <a:tcPr/>
                 </a:tc>
-                <a:tc>
+                <a:tc gridSpan="2">
                   <a:txBody>
                     <a:bodyPr/>
                     <a:lstStyle/>
                     <a:p>
                       <a:pPr algn="ctr"/>
                       <a:endParaRPr lang="en-US" dirty="0"/>
+                    </a:p>
+                  </a:txBody>
+                  <a:tcPr/>
+                </a:tc>
+                <a:tc hMerge="1">
+                  <a:txBody>
+                    <a:bodyPr/>
+                    <a:lstStyle/>
+                    <a:p>
+                      <a:endParaRPr lang="en-US"/>
                     </a:p>
                   </a:txBody>
                   <a:tcPr/>
@@ -4754,13 +4805,23 @@
                   </a:txBody>
                   <a:tcPr/>
                 </a:tc>
-                <a:tc>
+                <a:tc gridSpan="2">
                   <a:txBody>
                     <a:bodyPr/>
                     <a:lstStyle/>
                     <a:p>
                       <a:pPr algn="ctr"/>
                       <a:endParaRPr lang="en-US" dirty="0"/>
+                    </a:p>
+                  </a:txBody>
+                  <a:tcPr/>
+                </a:tc>
+                <a:tc hMerge="1">
+                  <a:txBody>
+                    <a:bodyPr/>
+                    <a:lstStyle/>
+                    <a:p>
+                      <a:endParaRPr lang="en-US"/>
                     </a:p>
                   </a:txBody>
                   <a:tcPr/>
@@ -4828,13 +4889,23 @@
                   </a:txBody>
                   <a:tcPr/>
                 </a:tc>
-                <a:tc>
+                <a:tc gridSpan="2">
                   <a:txBody>
                     <a:bodyPr/>
                     <a:lstStyle/>
                     <a:p>
                       <a:pPr algn="ctr"/>
                       <a:endParaRPr lang="en-US" dirty="0"/>
+                    </a:p>
+                  </a:txBody>
+                  <a:tcPr/>
+                </a:tc>
+                <a:tc hMerge="1">
+                  <a:txBody>
+                    <a:bodyPr/>
+                    <a:lstStyle/>
+                    <a:p>
+                      <a:endParaRPr lang="en-US"/>
                     </a:p>
                   </a:txBody>
                   <a:tcPr/>
@@ -4899,13 +4970,23 @@
                   </a:txBody>
                   <a:tcPr/>
                 </a:tc>
-                <a:tc>
+                <a:tc gridSpan="2">
                   <a:txBody>
                     <a:bodyPr/>
                     <a:lstStyle/>
                     <a:p>
                       <a:pPr algn="ctr"/>
                       <a:endParaRPr lang="en-US" dirty="0"/>
+                    </a:p>
+                  </a:txBody>
+                  <a:tcPr/>
+                </a:tc>
+                <a:tc hMerge="1">
+                  <a:txBody>
+                    <a:bodyPr/>
+                    <a:lstStyle/>
+                    <a:p>
+                      <a:endParaRPr lang="en-US"/>
                     </a:p>
                   </a:txBody>
                   <a:tcPr/>
@@ -4970,12 +5051,22 @@
                   </a:txBody>
                   <a:tcPr/>
                 </a:tc>
-                <a:tc>
+                <a:tc gridSpan="2">
                   <a:txBody>
                     <a:bodyPr/>
                     <a:lstStyle/>
                     <a:p>
                       <a:pPr algn="ctr"/>
+                      <a:endParaRPr lang="en-US"/>
+                    </a:p>
+                  </a:txBody>
+                  <a:tcPr/>
+                </a:tc>
+                <a:tc hMerge="1">
+                  <a:txBody>
+                    <a:bodyPr/>
+                    <a:lstStyle/>
+                    <a:p>
                       <a:endParaRPr lang="en-US"/>
                     </a:p>
                   </a:txBody>
@@ -5045,12 +5136,22 @@
                   </a:txBody>
                   <a:tcPr/>
                 </a:tc>
-                <a:tc>
+                <a:tc gridSpan="2">
                   <a:txBody>
                     <a:bodyPr/>
                     <a:lstStyle/>
                     <a:p>
                       <a:pPr algn="ctr"/>
+                      <a:endParaRPr lang="en-US"/>
+                    </a:p>
+                  </a:txBody>
+                  <a:tcPr/>
+                </a:tc>
+                <a:tc hMerge="1">
+                  <a:txBody>
+                    <a:bodyPr/>
+                    <a:lstStyle/>
+                    <a:p>
                       <a:endParaRPr lang="en-US"/>
                     </a:p>
                   </a:txBody>

</xml_diff>